<commit_message>
Tabelle in Präsentation geupdatet (Kontinente alphabetisch sortiert
</commit_message>
<xml_diff>
--- a/Klausur/Klausurprojekt PZD.pptx
+++ b/Klausur/Klausurprojekt PZD.pptx
@@ -2405,7 +2405,7 @@
               </a14:hiddenLine>
             </a:ext>
             <a:ext uri="{FAA26D3D-D897-4be2-8F04-BA451C77F1D7}">
-              <ma14:placeholderFlag xmlns:ma14="http://schemas.microsoft.com/office/mac/drawingml/2011/main" xmlns="" val="1"/>
+              <ma14:placeholderFlag xmlns="" xmlns:ma14="http://schemas.microsoft.com/office/mac/drawingml/2011/main" val="1"/>
             </a:ext>
           </a:extLst>
         </p:spPr>
@@ -3858,10 +3858,10 @@
       </p:sp>
       <p:pic>
         <p:nvPicPr>
-          <p:cNvPr id="3" name="Grafik 2">
+          <p:cNvPr id="5" name="Grafik 4">
             <a:extLst>
               <a:ext uri="{FF2B5EF4-FFF2-40B4-BE49-F238E27FC236}">
-                <a16:creationId xmlns:a16="http://schemas.microsoft.com/office/drawing/2014/main" id="{33D781CC-CADB-4E5A-AA5A-CFC243363BE9}"/>
+                <a16:creationId xmlns:a16="http://schemas.microsoft.com/office/drawing/2014/main" id="{F1FFAA33-240E-4050-8232-B435A355DB09}"/>
               </a:ext>
             </a:extLst>
           </p:cNvPr>
@@ -3878,8 +3878,8 @@
         </p:blipFill>
         <p:spPr>
           <a:xfrm>
-            <a:off x="2461765" y="1580619"/>
-            <a:ext cx="4220469" cy="3696762"/>
+            <a:off x="2421147" y="1608657"/>
+            <a:ext cx="4301705" cy="3640686"/>
           </a:xfrm>
           <a:prstGeom prst="rect">
             <a:avLst/>
@@ -5144,6 +5144,24 @@
 </file>
 
 <file path=customXml/item1.xml><?xml version="1.0" encoding="utf-8"?>
+<p:properties xmlns:p="http://schemas.microsoft.com/office/2006/metadata/properties" xmlns:xsi="http://www.w3.org/2001/XMLSchema-instance" xmlns:pc="http://schemas.microsoft.com/office/infopath/2007/PartnerControls">
+  <documentManagement>
+    <PublishingExpirationDate xmlns="http://schemas.microsoft.com/sharepoint/v3" xsi:nil="true"/>
+    <PublishingStartDate xmlns="http://schemas.microsoft.com/sharepoint/v3" xsi:nil="true"/>
+  </documentManagement>
+</p:properties>
+</file>
+
+<file path=customXml/item2.xml><?xml version="1.0" encoding="utf-8"?>
+<?mso-contentType ?>
+<FormTemplates xmlns="http://schemas.microsoft.com/sharepoint/v3/contenttype/forms">
+  <Display>DocumentLibraryForm</Display>
+  <Edit>DocumentLibraryForm</Edit>
+  <New>DocumentLibraryForm</New>
+</FormTemplates>
+</file>
+
+<file path=customXml/item3.xml><?xml version="1.0" encoding="utf-8"?>
 <ct:contentTypeSchema xmlns:ct="http://schemas.microsoft.com/office/2006/metadata/contentType" xmlns:ma="http://schemas.microsoft.com/office/2006/metadata/properties/metaAttributes" ct:_="" ma:_="" ma:contentTypeName="Dokument" ma:contentTypeID="0x010100A9BF3A695EC2034AAE4DB9E7D5E75338" ma:contentTypeVersion="1" ma:contentTypeDescription="Ein neues Dokument erstellen." ma:contentTypeScope="" ma:versionID="2482249281ae2dbb1e7d275a1d8e4177">
   <xsd:schema xmlns:xsd="http://www.w3.org/2001/XMLSchema" xmlns:xs="http://www.w3.org/2001/XMLSchema" xmlns:p="http://schemas.microsoft.com/office/2006/metadata/properties" xmlns:ns1="http://schemas.microsoft.com/sharepoint/v3" targetNamespace="http://schemas.microsoft.com/office/2006/metadata/properties" ma:root="true" ma:fieldsID="62d986c303d7a4c351c7c2bc39a3db9c" ns1:_="">
     <xsd:import namespace="http://schemas.microsoft.com/sharepoint/v3"/>
@@ -5275,25 +5293,31 @@
 </ct:contentTypeSchema>
 </file>
 
-<file path=customXml/item2.xml><?xml version="1.0" encoding="utf-8"?>
-<?mso-contentType ?>
-<FormTemplates xmlns="http://schemas.microsoft.com/sharepoint/v3/contenttype/forms">
-  <Display>DocumentLibraryForm</Display>
-  <Edit>DocumentLibraryForm</Edit>
-  <New>DocumentLibraryForm</New>
-</FormTemplates>
+<file path=customXml/itemProps1.xml><?xml version="1.0" encoding="utf-8"?>
+<ds:datastoreItem xmlns:ds="http://schemas.openxmlformats.org/officeDocument/2006/customXml" ds:itemID="{E1941F1E-6F16-4904-8673-FDFB017F5F74}">
+  <ds:schemaRefs>
+    <ds:schemaRef ds:uri="http://schemas.microsoft.com/office/2006/metadata/properties"/>
+    <ds:schemaRef ds:uri="http://schemas.openxmlformats.org/package/2006/metadata/core-properties"/>
+    <ds:schemaRef ds:uri="http://schemas.microsoft.com/office/2006/documentManagement/types"/>
+    <ds:schemaRef ds:uri="http://purl.org/dc/dcmitype/"/>
+    <ds:schemaRef ds:uri="http://purl.org/dc/elements/1.1/"/>
+    <ds:schemaRef ds:uri="http://schemas.microsoft.com/office/infopath/2007/PartnerControls"/>
+    <ds:schemaRef ds:uri="http://purl.org/dc/terms/"/>
+    <ds:schemaRef ds:uri="http://schemas.microsoft.com/sharepoint/v3"/>
+    <ds:schemaRef ds:uri="http://www.w3.org/XML/1998/namespace"/>
+  </ds:schemaRefs>
+</ds:datastoreItem>
 </file>
 
-<file path=customXml/item3.xml><?xml version="1.0" encoding="utf-8"?>
-<p:properties xmlns:p="http://schemas.microsoft.com/office/2006/metadata/properties" xmlns:xsi="http://www.w3.org/2001/XMLSchema-instance" xmlns:pc="http://schemas.microsoft.com/office/infopath/2007/PartnerControls">
-  <documentManagement>
-    <PublishingExpirationDate xmlns="http://schemas.microsoft.com/sharepoint/v3" xsi:nil="true"/>
-    <PublishingStartDate xmlns="http://schemas.microsoft.com/sharepoint/v3" xsi:nil="true"/>
-  </documentManagement>
-</p:properties>
+<file path=customXml/itemProps2.xml><?xml version="1.0" encoding="utf-8"?>
+<ds:datastoreItem xmlns:ds="http://schemas.openxmlformats.org/officeDocument/2006/customXml" ds:itemID="{AB7D5C0A-FE65-4777-82AF-D685DD225982}">
+  <ds:schemaRefs>
+    <ds:schemaRef ds:uri="http://schemas.microsoft.com/sharepoint/v3/contenttype/forms"/>
+  </ds:schemaRefs>
+</ds:datastoreItem>
 </file>
 
-<file path=customXml/itemProps1.xml><?xml version="1.0" encoding="utf-8"?>
+<file path=customXml/itemProps3.xml><?xml version="1.0" encoding="utf-8"?>
 <ds:datastoreItem xmlns:ds="http://schemas.openxmlformats.org/officeDocument/2006/customXml" ds:itemID="{248F8CFE-4457-42AC-A267-1C4F5139867C}">
   <ds:schemaRefs>
     <ds:schemaRef ds:uri="http://schemas.microsoft.com/office/2006/metadata/contentType"/>
@@ -5309,28 +5333,4 @@
     <ds:schemaRef ds:uri="http://schemas.microsoft.com/internal/obd"/>
   </ds:schemaRefs>
 </ds:datastoreItem>
-</file>
-
-<file path=customXml/itemProps2.xml><?xml version="1.0" encoding="utf-8"?>
-<ds:datastoreItem xmlns:ds="http://schemas.openxmlformats.org/officeDocument/2006/customXml" ds:itemID="{AB7D5C0A-FE65-4777-82AF-D685DD225982}">
-  <ds:schemaRefs>
-    <ds:schemaRef ds:uri="http://schemas.microsoft.com/sharepoint/v3/contenttype/forms"/>
-  </ds:schemaRefs>
-</ds:datastoreItem>
-</file>
-
-<file path=customXml/itemProps3.xml><?xml version="1.0" encoding="utf-8"?>
-<ds:datastoreItem xmlns:ds="http://schemas.openxmlformats.org/officeDocument/2006/customXml" ds:itemID="{E1941F1E-6F16-4904-8673-FDFB017F5F74}">
-  <ds:schemaRefs>
-    <ds:schemaRef ds:uri="http://schemas.microsoft.com/office/2006/metadata/properties"/>
-    <ds:schemaRef ds:uri="http://schemas.openxmlformats.org/package/2006/metadata/core-properties"/>
-    <ds:schemaRef ds:uri="http://schemas.microsoft.com/office/2006/documentManagement/types"/>
-    <ds:schemaRef ds:uri="http://purl.org/dc/dcmitype/"/>
-    <ds:schemaRef ds:uri="http://purl.org/dc/elements/1.1/"/>
-    <ds:schemaRef ds:uri="http://schemas.microsoft.com/office/infopath/2007/PartnerControls"/>
-    <ds:schemaRef ds:uri="http://purl.org/dc/terms/"/>
-    <ds:schemaRef ds:uri="http://schemas.microsoft.com/sharepoint/v3"/>
-    <ds:schemaRef ds:uri="http://www.w3.org/XML/1998/namespace"/>
-  </ds:schemaRefs>
-</ds:datastoreItem>
 </file>
</xml_diff>

<commit_message>
Code und Präsentation fertig zur Abgabe
</commit_message>
<xml_diff>
--- a/Klausur/Klausurprojekt PZD.pptx
+++ b/Klausur/Klausurprojekt PZD.pptx
@@ -5,19 +5,20 @@
     <p:sldMasterId id="2147483694" r:id="rId4"/>
   </p:sldMasterIdLst>
   <p:notesMasterIdLst>
-    <p:notesMasterId r:id="rId12"/>
+    <p:notesMasterId r:id="rId13"/>
   </p:notesMasterIdLst>
   <p:handoutMasterIdLst>
-    <p:handoutMasterId r:id="rId13"/>
+    <p:handoutMasterId r:id="rId14"/>
   </p:handoutMasterIdLst>
   <p:sldIdLst>
     <p:sldId id="256" r:id="rId5"/>
     <p:sldId id="257" r:id="rId6"/>
     <p:sldId id="258" r:id="rId7"/>
     <p:sldId id="264" r:id="rId8"/>
-    <p:sldId id="259" r:id="rId9"/>
-    <p:sldId id="265" r:id="rId10"/>
-    <p:sldId id="261" r:id="rId11"/>
+    <p:sldId id="266" r:id="rId9"/>
+    <p:sldId id="259" r:id="rId10"/>
+    <p:sldId id="265" r:id="rId11"/>
+    <p:sldId id="261" r:id="rId12"/>
   </p:sldIdLst>
   <p:sldSz cx="9144000" cy="6858000" type="screen4x3"/>
   <p:notesSz cx="6858000" cy="9144000"/>
@@ -291,7 +292,7 @@
               <a:pPr>
                 <a:defRPr/>
               </a:pPr>
-              <a:t>05.07.2020</a:t>
+              <a:t>06.07.2020</a:t>
             </a:fld>
             <a:endParaRPr lang="de-DE"/>
           </a:p>
@@ -507,7 +508,7 @@
               <a:pPr>
                 <a:defRPr/>
               </a:pPr>
-              <a:t>05.07.2020</a:t>
+              <a:t>06.07.2020</a:t>
             </a:fld>
             <a:endParaRPr lang="de-DE"/>
           </a:p>
@@ -2405,7 +2406,7 @@
               </a14:hiddenLine>
             </a:ext>
             <a:ext uri="{FAA26D3D-D897-4be2-8F04-BA451C77F1D7}">
-              <ma14:placeholderFlag xmlns="" xmlns:ma14="http://schemas.microsoft.com/office/mac/drawingml/2011/main" val="1"/>
+              <ma14:placeholderFlag xmlns:ma14="http://schemas.microsoft.com/office/mac/drawingml/2011/main" xmlns="" val="1"/>
             </a:ext>
           </a:extLst>
         </p:spPr>
@@ -3794,6 +3795,133 @@
           <p:cNvPr id="2" name="Titel 1">
             <a:extLst>
               <a:ext uri="{FF2B5EF4-FFF2-40B4-BE49-F238E27FC236}">
+                <a16:creationId xmlns:a16="http://schemas.microsoft.com/office/drawing/2014/main" id="{78572694-489C-4366-B166-BFD14A8E803E}"/>
+              </a:ext>
+            </a:extLst>
+          </p:cNvPr>
+          <p:cNvSpPr>
+            <a:spLocks noGrp="1"/>
+          </p:cNvSpPr>
+          <p:nvPr>
+            <p:ph type="title"/>
+          </p:nvPr>
+        </p:nvSpPr>
+        <p:spPr/>
+        <p:txBody>
+          <a:bodyPr/>
+          <a:lstStyle/>
+          <a:p>
+            <a:r>
+              <a:rPr lang="de-DE" dirty="0"/>
+              <a:t>Gegenüberstellung pm10 – pm2.5</a:t>
+            </a:r>
+          </a:p>
+        </p:txBody>
+      </p:sp>
+      <p:sp>
+        <p:nvSpPr>
+          <p:cNvPr id="4" name="Foliennummernplatzhalter 3">
+            <a:extLst>
+              <a:ext uri="{FF2B5EF4-FFF2-40B4-BE49-F238E27FC236}">
+                <a16:creationId xmlns:a16="http://schemas.microsoft.com/office/drawing/2014/main" id="{DA488E9B-877B-43CC-BB58-5B58C67C758C}"/>
+              </a:ext>
+            </a:extLst>
+          </p:cNvPr>
+          <p:cNvSpPr>
+            <a:spLocks noGrp="1"/>
+          </p:cNvSpPr>
+          <p:nvPr>
+            <p:ph type="sldNum" sz="quarter" idx="16"/>
+          </p:nvPr>
+        </p:nvSpPr>
+        <p:spPr/>
+        <p:txBody>
+          <a:bodyPr/>
+          <a:lstStyle/>
+          <a:p>
+            <a:pPr>
+              <a:defRPr/>
+            </a:pPr>
+            <a:r>
+              <a:rPr lang="de-DE"/>
+              <a:t>Folie </a:t>
+            </a:r>
+            <a:fld id="{35E7000C-7611-1A4F-AD21-C57D6B4C52E4}" type="slidenum">
+              <a:rPr lang="de-DE" smtClean="0"/>
+              <a:pPr>
+                <a:defRPr/>
+              </a:pPr>
+              <a:t>5</a:t>
+            </a:fld>
+            <a:endParaRPr lang="de-DE"/>
+          </a:p>
+        </p:txBody>
+      </p:sp>
+      <p:pic>
+        <p:nvPicPr>
+          <p:cNvPr id="6" name="Grafik 5">
+            <a:extLst>
+              <a:ext uri="{FF2B5EF4-FFF2-40B4-BE49-F238E27FC236}">
+                <a16:creationId xmlns:a16="http://schemas.microsoft.com/office/drawing/2014/main" id="{3083236F-4878-4531-8821-304600A599A2}"/>
+              </a:ext>
+            </a:extLst>
+          </p:cNvPr>
+          <p:cNvPicPr>
+            <a:picLocks noChangeAspect="1"/>
+          </p:cNvPicPr>
+          <p:nvPr/>
+        </p:nvPicPr>
+        <p:blipFill>
+          <a:blip r:embed="rId2"/>
+          <a:stretch>
+            <a:fillRect/>
+          </a:stretch>
+        </p:blipFill>
+        <p:spPr>
+          <a:xfrm>
+            <a:off x="2316298" y="1882309"/>
+            <a:ext cx="4374813" cy="4318280"/>
+          </a:xfrm>
+          <a:prstGeom prst="rect">
+            <a:avLst/>
+          </a:prstGeom>
+        </p:spPr>
+      </p:pic>
+    </p:spTree>
+    <p:extLst>
+      <p:ext uri="{BB962C8B-B14F-4D97-AF65-F5344CB8AC3E}">
+        <p14:creationId xmlns:p14="http://schemas.microsoft.com/office/powerpoint/2010/main" val="1531385580"/>
+      </p:ext>
+    </p:extLst>
+  </p:cSld>
+  <p:clrMapOvr>
+    <a:masterClrMapping/>
+  </p:clrMapOvr>
+</p:sld>
+</file>
+
+<file path=ppt/slides/slide6.xml><?xml version="1.0" encoding="utf-8"?>
+<p:sld xmlns:a="http://schemas.openxmlformats.org/drawingml/2006/main" xmlns:r="http://schemas.openxmlformats.org/officeDocument/2006/relationships" xmlns:p="http://schemas.openxmlformats.org/presentationml/2006/main">
+  <p:cSld>
+    <p:spTree>
+      <p:nvGrpSpPr>
+        <p:cNvPr id="1" name=""/>
+        <p:cNvGrpSpPr/>
+        <p:nvPr/>
+      </p:nvGrpSpPr>
+      <p:grpSpPr>
+        <a:xfrm>
+          <a:off x="0" y="0"/>
+          <a:ext cx="0" cy="0"/>
+          <a:chOff x="0" y="0"/>
+          <a:chExt cx="0" cy="0"/>
+        </a:xfrm>
+      </p:grpSpPr>
+      <p:sp>
+        <p:nvSpPr>
+          <p:cNvPr id="2" name="Titel 1">
+            <a:extLst>
+              <a:ext uri="{FF2B5EF4-FFF2-40B4-BE49-F238E27FC236}">
                 <a16:creationId xmlns:a16="http://schemas.microsoft.com/office/drawing/2014/main" id="{12350BFF-0A8D-44B2-BA9D-CD09C5A00EEF}"/>
               </a:ext>
             </a:extLst>
@@ -3850,7 +3978,7 @@
               <a:pPr>
                 <a:defRPr/>
               </a:pPr>
-              <a:t>5</a:t>
+              <a:t>6</a:t>
             </a:fld>
             <a:endParaRPr lang="de-DE"/>
           </a:p>
@@ -3899,7 +4027,7 @@
 </p:sld>
 </file>
 
-<file path=ppt/slides/slide6.xml><?xml version="1.0" encoding="utf-8"?>
+<file path=ppt/slides/slide7.xml><?xml version="1.0" encoding="utf-8"?>
 <p:sld xmlns:a="http://schemas.openxmlformats.org/drawingml/2006/main" xmlns:r="http://schemas.openxmlformats.org/officeDocument/2006/relationships" xmlns:p="http://schemas.openxmlformats.org/presentationml/2006/main">
   <p:cSld>
     <p:spTree>
@@ -3978,7 +4106,7 @@
               <a:pPr>
                 <a:defRPr/>
               </a:pPr>
-              <a:t>6</a:t>
+              <a:t>7</a:t>
             </a:fld>
             <a:endParaRPr lang="de-DE"/>
           </a:p>
@@ -3986,10 +4114,10 @@
       </p:sp>
       <p:pic>
         <p:nvPicPr>
-          <p:cNvPr id="8" name="Grafik 7">
+          <p:cNvPr id="7" name="Grafik 6">
             <a:extLst>
               <a:ext uri="{FF2B5EF4-FFF2-40B4-BE49-F238E27FC236}">
-                <a16:creationId xmlns:a16="http://schemas.microsoft.com/office/drawing/2014/main" id="{6629A178-95B5-417B-B100-DF982DE6E350}"/>
+                <a16:creationId xmlns:a16="http://schemas.microsoft.com/office/drawing/2014/main" id="{3273F1C9-3D27-4345-9371-D38570EEBBF6}"/>
               </a:ext>
             </a:extLst>
           </p:cNvPr>
@@ -4006,8 +4134,8 @@
         </p:blipFill>
         <p:spPr>
           <a:xfrm>
-            <a:off x="1929798" y="1752218"/>
-            <a:ext cx="5284404" cy="3353564"/>
+            <a:off x="1929798" y="1637892"/>
+            <a:ext cx="5284404" cy="3582216"/>
           </a:xfrm>
           <a:prstGeom prst="rect">
             <a:avLst/>
@@ -4027,7 +4155,7 @@
 </p:sld>
 </file>
 
-<file path=ppt/slides/slide7.xml><?xml version="1.0" encoding="utf-8"?>
+<file path=ppt/slides/slide8.xml><?xml version="1.0" encoding="utf-8"?>
 <p:sld xmlns:a="http://schemas.openxmlformats.org/drawingml/2006/main" xmlns:r="http://schemas.openxmlformats.org/officeDocument/2006/relationships" xmlns:p="http://schemas.openxmlformats.org/presentationml/2006/main">
   <p:cSld>
     <p:spTree>
@@ -4106,7 +4234,7 @@
               <a:pPr>
                 <a:defRPr/>
               </a:pPr>
-              <a:t>7</a:t>
+              <a:t>8</a:t>
             </a:fld>
             <a:endParaRPr lang="de-DE"/>
           </a:p>
@@ -4114,10 +4242,10 @@
       </p:sp>
       <p:pic>
         <p:nvPicPr>
-          <p:cNvPr id="8" name="Grafik 7">
+          <p:cNvPr id="15" name="Grafik 14">
             <a:extLst>
               <a:ext uri="{FF2B5EF4-FFF2-40B4-BE49-F238E27FC236}">
-                <a16:creationId xmlns:a16="http://schemas.microsoft.com/office/drawing/2014/main" id="{21B20580-6F81-4546-91C6-83ACD6E657DC}"/>
+                <a16:creationId xmlns:a16="http://schemas.microsoft.com/office/drawing/2014/main" id="{FA6A1898-4F15-45DB-A2AA-9F6EB5399ECE}"/>
               </a:ext>
             </a:extLst>
           </p:cNvPr>
@@ -4134,8 +4262,8 @@
         </p:blipFill>
         <p:spPr>
           <a:xfrm>
-            <a:off x="758437" y="2110665"/>
-            <a:ext cx="3745268" cy="2636669"/>
+            <a:off x="679561" y="2383616"/>
+            <a:ext cx="3600000" cy="2589796"/>
           </a:xfrm>
           <a:prstGeom prst="rect">
             <a:avLst/>
@@ -4144,10 +4272,10 @@
       </p:pic>
       <p:pic>
         <p:nvPicPr>
-          <p:cNvPr id="5" name="Grafik 4">
+          <p:cNvPr id="17" name="Grafik 16">
             <a:extLst>
               <a:ext uri="{FF2B5EF4-FFF2-40B4-BE49-F238E27FC236}">
-                <a16:creationId xmlns:a16="http://schemas.microsoft.com/office/drawing/2014/main" id="{180FDF41-797F-49F8-8ED4-E0FE140FCB15}"/>
+                <a16:creationId xmlns:a16="http://schemas.microsoft.com/office/drawing/2014/main" id="{DB40CA71-45BE-413D-8930-6C10639680B8}"/>
               </a:ext>
             </a:extLst>
           </p:cNvPr>
@@ -4164,8 +4292,8 @@
         </p:blipFill>
         <p:spPr>
           <a:xfrm>
-            <a:off x="4640297" y="2111558"/>
-            <a:ext cx="3744000" cy="2635776"/>
+            <a:off x="4864439" y="2383616"/>
+            <a:ext cx="3600000" cy="2589796"/>
           </a:xfrm>
           <a:prstGeom prst="rect">
             <a:avLst/>
@@ -5144,24 +5272,6 @@
 </file>
 
 <file path=customXml/item1.xml><?xml version="1.0" encoding="utf-8"?>
-<p:properties xmlns:p="http://schemas.microsoft.com/office/2006/metadata/properties" xmlns:xsi="http://www.w3.org/2001/XMLSchema-instance" xmlns:pc="http://schemas.microsoft.com/office/infopath/2007/PartnerControls">
-  <documentManagement>
-    <PublishingExpirationDate xmlns="http://schemas.microsoft.com/sharepoint/v3" xsi:nil="true"/>
-    <PublishingStartDate xmlns="http://schemas.microsoft.com/sharepoint/v3" xsi:nil="true"/>
-  </documentManagement>
-</p:properties>
-</file>
-
-<file path=customXml/item2.xml><?xml version="1.0" encoding="utf-8"?>
-<?mso-contentType ?>
-<FormTemplates xmlns="http://schemas.microsoft.com/sharepoint/v3/contenttype/forms">
-  <Display>DocumentLibraryForm</Display>
-  <Edit>DocumentLibraryForm</Edit>
-  <New>DocumentLibraryForm</New>
-</FormTemplates>
-</file>
-
-<file path=customXml/item3.xml><?xml version="1.0" encoding="utf-8"?>
 <ct:contentTypeSchema xmlns:ct="http://schemas.microsoft.com/office/2006/metadata/contentType" xmlns:ma="http://schemas.microsoft.com/office/2006/metadata/properties/metaAttributes" ct:_="" ma:_="" ma:contentTypeName="Dokument" ma:contentTypeID="0x010100A9BF3A695EC2034AAE4DB9E7D5E75338" ma:contentTypeVersion="1" ma:contentTypeDescription="Ein neues Dokument erstellen." ma:contentTypeScope="" ma:versionID="2482249281ae2dbb1e7d275a1d8e4177">
   <xsd:schema xmlns:xsd="http://www.w3.org/2001/XMLSchema" xmlns:xs="http://www.w3.org/2001/XMLSchema" xmlns:p="http://schemas.microsoft.com/office/2006/metadata/properties" xmlns:ns1="http://schemas.microsoft.com/sharepoint/v3" targetNamespace="http://schemas.microsoft.com/office/2006/metadata/properties" ma:root="true" ma:fieldsID="62d986c303d7a4c351c7c2bc39a3db9c" ns1:_="">
     <xsd:import namespace="http://schemas.microsoft.com/sharepoint/v3"/>
@@ -5293,31 +5403,25 @@
 </ct:contentTypeSchema>
 </file>
 
-<file path=customXml/itemProps1.xml><?xml version="1.0" encoding="utf-8"?>
-<ds:datastoreItem xmlns:ds="http://schemas.openxmlformats.org/officeDocument/2006/customXml" ds:itemID="{E1941F1E-6F16-4904-8673-FDFB017F5F74}">
-  <ds:schemaRefs>
-    <ds:schemaRef ds:uri="http://schemas.microsoft.com/office/2006/metadata/properties"/>
-    <ds:schemaRef ds:uri="http://schemas.openxmlformats.org/package/2006/metadata/core-properties"/>
-    <ds:schemaRef ds:uri="http://schemas.microsoft.com/office/2006/documentManagement/types"/>
-    <ds:schemaRef ds:uri="http://purl.org/dc/dcmitype/"/>
-    <ds:schemaRef ds:uri="http://purl.org/dc/elements/1.1/"/>
-    <ds:schemaRef ds:uri="http://schemas.microsoft.com/office/infopath/2007/PartnerControls"/>
-    <ds:schemaRef ds:uri="http://purl.org/dc/terms/"/>
-    <ds:schemaRef ds:uri="http://schemas.microsoft.com/sharepoint/v3"/>
-    <ds:schemaRef ds:uri="http://www.w3.org/XML/1998/namespace"/>
-  </ds:schemaRefs>
-</ds:datastoreItem>
+<file path=customXml/item2.xml><?xml version="1.0" encoding="utf-8"?>
+<?mso-contentType ?>
+<FormTemplates xmlns="http://schemas.microsoft.com/sharepoint/v3/contenttype/forms">
+  <Display>DocumentLibraryForm</Display>
+  <Edit>DocumentLibraryForm</Edit>
+  <New>DocumentLibraryForm</New>
+</FormTemplates>
 </file>
 
-<file path=customXml/itemProps2.xml><?xml version="1.0" encoding="utf-8"?>
-<ds:datastoreItem xmlns:ds="http://schemas.openxmlformats.org/officeDocument/2006/customXml" ds:itemID="{AB7D5C0A-FE65-4777-82AF-D685DD225982}">
-  <ds:schemaRefs>
-    <ds:schemaRef ds:uri="http://schemas.microsoft.com/sharepoint/v3/contenttype/forms"/>
-  </ds:schemaRefs>
-</ds:datastoreItem>
+<file path=customXml/item3.xml><?xml version="1.0" encoding="utf-8"?>
+<p:properties xmlns:p="http://schemas.microsoft.com/office/2006/metadata/properties" xmlns:xsi="http://www.w3.org/2001/XMLSchema-instance" xmlns:pc="http://schemas.microsoft.com/office/infopath/2007/PartnerControls">
+  <documentManagement>
+    <PublishingExpirationDate xmlns="http://schemas.microsoft.com/sharepoint/v3" xsi:nil="true"/>
+    <PublishingStartDate xmlns="http://schemas.microsoft.com/sharepoint/v3" xsi:nil="true"/>
+  </documentManagement>
+</p:properties>
 </file>
 
-<file path=customXml/itemProps3.xml><?xml version="1.0" encoding="utf-8"?>
+<file path=customXml/itemProps1.xml><?xml version="1.0" encoding="utf-8"?>
 <ds:datastoreItem xmlns:ds="http://schemas.openxmlformats.org/officeDocument/2006/customXml" ds:itemID="{248F8CFE-4457-42AC-A267-1C4F5139867C}">
   <ds:schemaRefs>
     <ds:schemaRef ds:uri="http://schemas.microsoft.com/office/2006/metadata/contentType"/>
@@ -5333,4 +5437,28 @@
     <ds:schemaRef ds:uri="http://schemas.microsoft.com/internal/obd"/>
   </ds:schemaRefs>
 </ds:datastoreItem>
+</file>
+
+<file path=customXml/itemProps2.xml><?xml version="1.0" encoding="utf-8"?>
+<ds:datastoreItem xmlns:ds="http://schemas.openxmlformats.org/officeDocument/2006/customXml" ds:itemID="{AB7D5C0A-FE65-4777-82AF-D685DD225982}">
+  <ds:schemaRefs>
+    <ds:schemaRef ds:uri="http://schemas.microsoft.com/sharepoint/v3/contenttype/forms"/>
+  </ds:schemaRefs>
+</ds:datastoreItem>
+</file>
+
+<file path=customXml/itemProps3.xml><?xml version="1.0" encoding="utf-8"?>
+<ds:datastoreItem xmlns:ds="http://schemas.openxmlformats.org/officeDocument/2006/customXml" ds:itemID="{E1941F1E-6F16-4904-8673-FDFB017F5F74}">
+  <ds:schemaRefs>
+    <ds:schemaRef ds:uri="http://schemas.microsoft.com/office/2006/metadata/properties"/>
+    <ds:schemaRef ds:uri="http://schemas.openxmlformats.org/package/2006/metadata/core-properties"/>
+    <ds:schemaRef ds:uri="http://schemas.microsoft.com/office/2006/documentManagement/types"/>
+    <ds:schemaRef ds:uri="http://purl.org/dc/dcmitype/"/>
+    <ds:schemaRef ds:uri="http://purl.org/dc/elements/1.1/"/>
+    <ds:schemaRef ds:uri="http://schemas.microsoft.com/office/infopath/2007/PartnerControls"/>
+    <ds:schemaRef ds:uri="http://purl.org/dc/terms/"/>
+    <ds:schemaRef ds:uri="http://schemas.microsoft.com/sharepoint/v3"/>
+    <ds:schemaRef ds:uri="http://www.w3.org/XML/1998/namespace"/>
+  </ds:schemaRefs>
+</ds:datastoreItem>
 </file>
</xml_diff>